<commit_message>
electronics sales data market research many queries created, clean up incomplete. key insights ppt incomplete
</commit_message>
<xml_diff>
--- a/key_insights.pptx
+++ b/key_insights.pptx
@@ -5,14 +5,15 @@
     <p:sldMasterId id="2147483648" r:id="rId4"/>
   </p:sldMasterIdLst>
   <p:notesMasterIdLst>
-    <p:notesMasterId r:id="rId7"/>
+    <p:notesMasterId r:id="rId8"/>
   </p:notesMasterIdLst>
   <p:handoutMasterIdLst>
-    <p:handoutMasterId r:id="rId8"/>
+    <p:handoutMasterId r:id="rId9"/>
   </p:handoutMasterIdLst>
   <p:sldIdLst>
     <p:sldId id="280" r:id="rId5"/>
     <p:sldId id="281" r:id="rId6"/>
+    <p:sldId id="282" r:id="rId7"/>
   </p:sldIdLst>
   <p:sldSz cx="12192000" cy="6858000"/>
   <p:notesSz cx="6858000" cy="9144000"/>
@@ -5258,6 +5259,121 @@
     <p:extLst>
       <p:ext uri="{BB962C8B-B14F-4D97-AF65-F5344CB8AC3E}">
         <p14:creationId xmlns:p14="http://schemas.microsoft.com/office/powerpoint/2010/main" val="3854886566"/>
+      </p:ext>
+    </p:extLst>
+  </p:cSld>
+  <p:clrMapOvr>
+    <a:masterClrMapping/>
+  </p:clrMapOvr>
+</p:sld>
+</file>
+
+<file path=ppt/slides/slide3.xml><?xml version="1.0" encoding="utf-8"?>
+<p:sld xmlns:a="http://schemas.openxmlformats.org/drawingml/2006/main" xmlns:r="http://schemas.openxmlformats.org/officeDocument/2006/relationships" xmlns:p="http://schemas.openxmlformats.org/presentationml/2006/main">
+  <p:cSld>
+    <p:bg>
+      <p:bgPr>
+        <a:solidFill>
+          <a:schemeClr val="tx1"/>
+        </a:solidFill>
+        <a:effectLst/>
+      </p:bgPr>
+    </p:bg>
+    <p:spTree>
+      <p:nvGrpSpPr>
+        <p:cNvPr id="1" name=""/>
+        <p:cNvGrpSpPr/>
+        <p:nvPr/>
+      </p:nvGrpSpPr>
+      <p:grpSpPr>
+        <a:xfrm>
+          <a:off x="0" y="0"/>
+          <a:ext cx="0" cy="0"/>
+          <a:chOff x="0" y="0"/>
+          <a:chExt cx="0" cy="0"/>
+        </a:xfrm>
+      </p:grpSpPr>
+      <p:sp>
+        <p:nvSpPr>
+          <p:cNvPr id="2" name="Title 1">
+            <a:extLst>
+              <a:ext uri="{FF2B5EF4-FFF2-40B4-BE49-F238E27FC236}">
+                <a16:creationId xmlns:a16="http://schemas.microsoft.com/office/drawing/2014/main" id="{64D58B15-CEA0-5424-1F56-1BBA32AB06A3}"/>
+              </a:ext>
+            </a:extLst>
+          </p:cNvPr>
+          <p:cNvSpPr>
+            <a:spLocks noGrp="1"/>
+          </p:cNvSpPr>
+          <p:nvPr>
+            <p:ph type="title"/>
+          </p:nvPr>
+        </p:nvSpPr>
+        <p:spPr/>
+        <p:txBody>
+          <a:bodyPr/>
+          <a:lstStyle/>
+          <a:p>
+            <a:r>
+              <a:rPr lang="en-US" dirty="0">
+                <a:solidFill>
+                  <a:schemeClr val="bg1"/>
+                </a:solidFill>
+              </a:rPr>
+              <a:t>Electronics Sales data</a:t>
+            </a:r>
+          </a:p>
+        </p:txBody>
+      </p:sp>
+      <p:sp>
+        <p:nvSpPr>
+          <p:cNvPr id="3" name="Table Placeholder 2">
+            <a:extLst>
+              <a:ext uri="{FF2B5EF4-FFF2-40B4-BE49-F238E27FC236}">
+                <a16:creationId xmlns:a16="http://schemas.microsoft.com/office/drawing/2014/main" id="{FBF950C8-74F7-FEE1-6FFE-75446E85D767}"/>
+              </a:ext>
+            </a:extLst>
+          </p:cNvPr>
+          <p:cNvSpPr>
+            <a:spLocks noGrp="1"/>
+          </p:cNvSpPr>
+          <p:nvPr>
+            <p:ph type="tbl" sz="quarter" idx="13"/>
+          </p:nvPr>
+        </p:nvSpPr>
+        <p:spPr/>
+        <p:txBody>
+          <a:bodyPr/>
+          <a:lstStyle/>
+          <a:p>
+            <a:r>
+              <a:rPr lang="en-US" dirty="0">
+                <a:solidFill>
+                  <a:schemeClr val="bg1"/>
+                </a:solidFill>
+              </a:rPr>
+              <a:t>Gen-Z reported to make </a:t>
+            </a:r>
+            <a:r>
+              <a:rPr lang="en-US">
+                <a:solidFill>
+                  <a:schemeClr val="bg1"/>
+                </a:solidFill>
+              </a:rPr>
+              <a:t>electronic sales </a:t>
+            </a:r>
+            <a:endParaRPr lang="en-US" dirty="0">
+              <a:solidFill>
+                <a:schemeClr val="bg1"/>
+              </a:solidFill>
+            </a:endParaRPr>
+          </a:p>
+        </p:txBody>
+      </p:sp>
+    </p:spTree>
+    <p:extLst>
+      <p:ext uri="{BB962C8B-B14F-4D97-AF65-F5344CB8AC3E}">
+        <p14:creationId xmlns:p14="http://schemas.microsoft.com/office/powerpoint/2010/main" val="3252030299"/>
       </p:ext>
     </p:extLst>
   </p:cSld>

</xml_diff>

<commit_message>
key insights one more slide for outline of business and market research completed
</commit_message>
<xml_diff>
--- a/key_insights.pptx
+++ b/key_insights.pptx
@@ -5352,7 +5352,73 @@
                   <a:schemeClr val="bg1"/>
                 </a:solidFill>
               </a:rPr>
-              <a:t>Gen-Z reported to make </a:t>
+              <a:t>An interesting find in the data is that all generations have very similar averages for Product Price, Customer Satisfaction, &amp; Purchase Frequency</a:t>
+            </a:r>
+          </a:p>
+          <a:p>
+            <a:r>
+              <a:rPr lang="en-US" dirty="0">
+                <a:solidFill>
+                  <a:schemeClr val="bg1"/>
+                </a:solidFill>
+              </a:rPr>
+              <a:t>Samsung was the most popular brand with HP as a close 2</a:t>
+            </a:r>
+            <a:r>
+              <a:rPr lang="en-US" baseline="30000" dirty="0">
+                <a:solidFill>
+                  <a:schemeClr val="bg1"/>
+                </a:solidFill>
+              </a:rPr>
+              <a:t>nd</a:t>
+            </a:r>
+            <a:endParaRPr lang="en-US" dirty="0">
+              <a:solidFill>
+                <a:schemeClr val="bg1"/>
+              </a:solidFill>
+            </a:endParaRPr>
+          </a:p>
+          <a:p>
+            <a:r>
+              <a:rPr lang="en-US" dirty="0">
+                <a:solidFill>
+                  <a:schemeClr val="bg1"/>
+                </a:solidFill>
+              </a:rPr>
+              <a:t>Another interesting find was that Apple was the least popular brand</a:t>
+            </a:r>
+          </a:p>
+          <a:p>
+            <a:r>
+              <a:rPr lang="en-US" dirty="0">
+                <a:solidFill>
+                  <a:schemeClr val="bg1"/>
+                </a:solidFill>
+              </a:rPr>
+              <a:t>Laptops were the most popular category with smartphones as a close 2</a:t>
+            </a:r>
+            <a:r>
+              <a:rPr lang="en-US" baseline="30000" dirty="0">
+                <a:solidFill>
+                  <a:schemeClr val="bg1"/>
+                </a:solidFill>
+              </a:rPr>
+              <a:t>nd</a:t>
+            </a:r>
+            <a:endParaRPr lang="en-US" dirty="0">
+              <a:solidFill>
+                <a:schemeClr val="bg1"/>
+              </a:solidFill>
+            </a:endParaRPr>
+          </a:p>
+          <a:p>
+            <a:r>
+              <a:rPr lang="en-US" dirty="0">
+                <a:solidFill>
+                  <a:schemeClr val="bg1"/>
+                </a:solidFill>
+              </a:rPr>
+              <a:t>Women were more likely </a:t>
             </a:r>
             <a:r>
               <a:rPr lang="en-US">
@@ -5360,7 +5426,7 @@
                   <a:schemeClr val="bg1"/>
                 </a:solidFill>
               </a:rPr>
-              <a:t>electronic sales </a:t>
+              <a:t>to purchase at least 10 times a year</a:t>
             </a:r>
             <a:endParaRPr lang="en-US" dirty="0">
               <a:solidFill>

</xml_diff>

<commit_message>
key insights completed, extra queries added to market research
</commit_message>
<xml_diff>
--- a/key_insights.pptx
+++ b/key_insights.pptx
@@ -5,15 +5,16 @@
     <p:sldMasterId id="2147483648" r:id="rId4"/>
   </p:sldMasterIdLst>
   <p:notesMasterIdLst>
-    <p:notesMasterId r:id="rId8"/>
+    <p:notesMasterId r:id="rId9"/>
   </p:notesMasterIdLst>
   <p:handoutMasterIdLst>
-    <p:handoutMasterId r:id="rId9"/>
+    <p:handoutMasterId r:id="rId10"/>
   </p:handoutMasterIdLst>
   <p:sldIdLst>
     <p:sldId id="280" r:id="rId5"/>
     <p:sldId id="281" r:id="rId6"/>
     <p:sldId id="282" r:id="rId7"/>
+    <p:sldId id="283" r:id="rId8"/>
   </p:sldIdLst>
   <p:sldSz cx="12192000" cy="6858000"/>
   <p:notesSz cx="6858000" cy="9144000"/>
@@ -5076,7 +5077,14 @@
           <a:p>
             <a:r>
               <a:rPr lang="en-US" dirty="0"/>
-              <a:t>THE FUTURE OF E-COMMERCE IS IN ELECTRONICS</a:t>
+              <a:t>THE FUTURE OF retail</a:t>
+            </a:r>
+            <a:br>
+              <a:rPr lang="en-US" dirty="0"/>
+            </a:br>
+            <a:r>
+              <a:rPr lang="en-US" dirty="0"/>
+              <a:t>is E-COMMERCE</a:t>
             </a:r>
           </a:p>
         </p:txBody>
@@ -5418,7 +5426,162 @@
                   <a:schemeClr val="bg1"/>
                 </a:solidFill>
               </a:rPr>
-              <a:t>Women were more likely </a:t>
+              <a:t>Women were more likely to purchase at least 10 times a year</a:t>
+            </a:r>
+          </a:p>
+          <a:p>
+            <a:r>
+              <a:rPr lang="en-US" dirty="0">
+                <a:solidFill>
+                  <a:schemeClr val="bg1"/>
+                </a:solidFill>
+              </a:rPr>
+              <a:t>Women were also more likely to give higher satisfaction scores</a:t>
+            </a:r>
+          </a:p>
+        </p:txBody>
+      </p:sp>
+    </p:spTree>
+    <p:extLst>
+      <p:ext uri="{BB962C8B-B14F-4D97-AF65-F5344CB8AC3E}">
+        <p14:creationId xmlns:p14="http://schemas.microsoft.com/office/powerpoint/2010/main" val="3252030299"/>
+      </p:ext>
+    </p:extLst>
+  </p:cSld>
+  <p:clrMapOvr>
+    <a:masterClrMapping/>
+  </p:clrMapOvr>
+</p:sld>
+</file>
+
+<file path=ppt/slides/slide4.xml><?xml version="1.0" encoding="utf-8"?>
+<p:sld xmlns:a="http://schemas.openxmlformats.org/drawingml/2006/main" xmlns:r="http://schemas.openxmlformats.org/officeDocument/2006/relationships" xmlns:p="http://schemas.openxmlformats.org/presentationml/2006/main">
+  <p:cSld>
+    <p:bg>
+      <p:bgPr>
+        <a:solidFill>
+          <a:schemeClr val="tx1"/>
+        </a:solidFill>
+        <a:effectLst/>
+      </p:bgPr>
+    </p:bg>
+    <p:spTree>
+      <p:nvGrpSpPr>
+        <p:cNvPr id="1" name=""/>
+        <p:cNvGrpSpPr/>
+        <p:nvPr/>
+      </p:nvGrpSpPr>
+      <p:grpSpPr>
+        <a:xfrm>
+          <a:off x="0" y="0"/>
+          <a:ext cx="0" cy="0"/>
+          <a:chOff x="0" y="0"/>
+          <a:chExt cx="0" cy="0"/>
+        </a:xfrm>
+      </p:grpSpPr>
+      <p:sp>
+        <p:nvSpPr>
+          <p:cNvPr id="2" name="Title 1">
+            <a:extLst>
+              <a:ext uri="{FF2B5EF4-FFF2-40B4-BE49-F238E27FC236}">
+                <a16:creationId xmlns:a16="http://schemas.microsoft.com/office/drawing/2014/main" id="{F6DC623F-DC47-F7C9-D152-B82E3E582727}"/>
+              </a:ext>
+            </a:extLst>
+          </p:cNvPr>
+          <p:cNvSpPr>
+            <a:spLocks noGrp="1"/>
+          </p:cNvSpPr>
+          <p:nvPr>
+            <p:ph type="title"/>
+          </p:nvPr>
+        </p:nvSpPr>
+        <p:spPr/>
+        <p:txBody>
+          <a:bodyPr/>
+          <a:lstStyle/>
+          <a:p>
+            <a:r>
+              <a:rPr lang="en-US" dirty="0">
+                <a:solidFill>
+                  <a:schemeClr val="bg1"/>
+                </a:solidFill>
+              </a:rPr>
+              <a:t>Key takeaways for business outline</a:t>
+            </a:r>
+          </a:p>
+        </p:txBody>
+      </p:sp>
+      <p:sp>
+        <p:nvSpPr>
+          <p:cNvPr id="3" name="Table Placeholder 2">
+            <a:extLst>
+              <a:ext uri="{FF2B5EF4-FFF2-40B4-BE49-F238E27FC236}">
+                <a16:creationId xmlns:a16="http://schemas.microsoft.com/office/drawing/2014/main" id="{1B384ECF-A145-715C-DE2C-D3CAE6FEFE36}"/>
+              </a:ext>
+            </a:extLst>
+          </p:cNvPr>
+          <p:cNvSpPr>
+            <a:spLocks noGrp="1"/>
+          </p:cNvSpPr>
+          <p:nvPr>
+            <p:ph type="tbl" sz="quarter" idx="13"/>
+          </p:nvPr>
+        </p:nvSpPr>
+        <p:spPr/>
+        <p:txBody>
+          <a:bodyPr/>
+          <a:lstStyle/>
+          <a:p>
+            <a:r>
+              <a:rPr lang="en-US" dirty="0">
+                <a:solidFill>
+                  <a:schemeClr val="bg1"/>
+                </a:solidFill>
+              </a:rPr>
+              <a:t>According to Statista, the electronics industry just recently passed fashion for the highest revenue in e-commerce</a:t>
+            </a:r>
+          </a:p>
+          <a:p>
+            <a:r>
+              <a:rPr lang="en-US" dirty="0">
+                <a:solidFill>
+                  <a:schemeClr val="bg1"/>
+                </a:solidFill>
+              </a:rPr>
+              <a:t>Based on my market research data:</a:t>
+            </a:r>
+          </a:p>
+          <a:p>
+            <a:pPr lvl="1"/>
+            <a:r>
+              <a:rPr lang="en-US" dirty="0">
+                <a:solidFill>
+                  <a:schemeClr val="bg1"/>
+                </a:solidFill>
+              </a:rPr>
+              <a:t>Focus on working with suppliers such as Samsung and HP</a:t>
+            </a:r>
+          </a:p>
+          <a:p>
+            <a:pPr lvl="1"/>
+            <a:r>
+              <a:rPr lang="en-US" dirty="0">
+                <a:solidFill>
+                  <a:schemeClr val="bg1"/>
+                </a:solidFill>
+              </a:rPr>
+              <a:t>Focus on products such laptops and smartphones</a:t>
+            </a:r>
+          </a:p>
+          <a:p>
+            <a:pPr lvl="1"/>
+            <a:r>
+              <a:rPr lang="en-US" dirty="0">
+                <a:solidFill>
+                  <a:schemeClr val="bg1"/>
+                </a:solidFill>
+              </a:rPr>
+              <a:t>Market strategy should be geared </a:t>
             </a:r>
             <a:r>
               <a:rPr lang="en-US">
@@ -5426,7 +5589,7 @@
                   <a:schemeClr val="bg1"/>
                 </a:solidFill>
               </a:rPr>
-              <a:t>to purchase at least 10 times a year</a:t>
+              <a:t>towards women</a:t>
             </a:r>
             <a:endParaRPr lang="en-US" dirty="0">
               <a:solidFill>
@@ -5434,12 +5597,20 @@
               </a:solidFill>
             </a:endParaRPr>
           </a:p>
+          <a:p>
+            <a:pPr lvl="1"/>
+            <a:endParaRPr lang="en-US" dirty="0">
+              <a:solidFill>
+                <a:schemeClr val="bg1"/>
+              </a:solidFill>
+            </a:endParaRPr>
+          </a:p>
         </p:txBody>
       </p:sp>
     </p:spTree>
     <p:extLst>
       <p:ext uri="{BB962C8B-B14F-4D97-AF65-F5344CB8AC3E}">
-        <p14:creationId xmlns:p14="http://schemas.microsoft.com/office/powerpoint/2010/main" val="3252030299"/>
+        <p14:creationId xmlns:p14="http://schemas.microsoft.com/office/powerpoint/2010/main" val="1019519489"/>
       </p:ext>
     </p:extLst>
   </p:cSld>

</xml_diff>